<commit_message>
update arch02.png for all
</commit_message>
<xml_diff>
--- a/template/template.pptx
+++ b/template/template.pptx
@@ -228,7 +228,7 @@
           <a:p>
             <a:fld id="{E8CF71B8-DF2A-2E41-BE66-2E18A767DA8A}" type="datetimeFigureOut">
               <a:rPr lang="en-US" smtClean="0"/>
-              <a:t>6/25/25</a:t>
+              <a:t>7/17/25</a:t>
             </a:fld>
             <a:endParaRPr lang="en-US"/>
           </a:p>
@@ -405,7 +405,7 @@
           <a:p>
             <a:fld id="{0DD60A27-BF12-6744-9E93-932A0E34D8BB}" type="datetimeFigureOut">
               <a:rPr lang="en-US" smtClean="0"/>
-              <a:t>6/25/25</a:t>
+              <a:t>7/17/25</a:t>
             </a:fld>
             <a:endParaRPr lang="en-US"/>
           </a:p>

</xml_diff>